<commit_message>
Material para consumir un servicio y coreada, ejercicio de consumo de servicio.
</commit_message>
<xml_diff>
--- a/iOS ObjectiveC/2. Interfaz grafica, dispositivo, WS/[FEUD] 2. Interfaz grafica, dispositivo, WS.pptx
+++ b/iOS ObjectiveC/2. Interfaz grafica, dispositivo, WS/[FEUD] 2. Interfaz grafica, dispositivo, WS.pptx
@@ -5,10 +5,10 @@
     <p:sldMasterId id="2147483650" r:id="rId1"/>
   </p:sldMasterIdLst>
   <p:notesMasterIdLst>
-    <p:notesMasterId r:id="rId25"/>
+    <p:notesMasterId r:id="rId24"/>
   </p:notesMasterIdLst>
   <p:handoutMasterIdLst>
-    <p:handoutMasterId r:id="rId26"/>
+    <p:handoutMasterId r:id="rId25"/>
   </p:handoutMasterIdLst>
   <p:sldIdLst>
     <p:sldId id="440" r:id="rId2"/>
@@ -33,7 +33,6 @@
     <p:sldId id="468" r:id="rId21"/>
     <p:sldId id="469" r:id="rId22"/>
     <p:sldId id="470" r:id="rId23"/>
-    <p:sldId id="457" r:id="rId24"/>
   </p:sldIdLst>
   <p:sldSz cx="9144000" cy="6858000" type="screen4x3"/>
   <p:notesSz cx="7124700" cy="9410700"/>
@@ -204,7 +203,7 @@
   </p:defaultTextStyle>
   <p:extLst>
     <p:ext uri="{EFAFB233-063F-42B5-8137-9DF3F51BA10A}">
-      <p15:sldGuideLst xmlns:p15="http://schemas.microsoft.com/office/powerpoint/2012/main" xmlns="">
+      <p15:sldGuideLst xmlns="" xmlns:p15="http://schemas.microsoft.com/office/powerpoint/2012/main">
         <p15:guide id="1" orient="horz" pos="2160">
           <p15:clr>
             <a:srgbClr val="A4A3A4"/>
@@ -218,7 +217,7 @@
       </p15:sldGuideLst>
     </p:ext>
     <p:ext uri="{2D200454-40CA-4A62-9FC3-DE9A4176ACB9}">
-      <p15:notesGuideLst xmlns:p15="http://schemas.microsoft.com/office/powerpoint/2012/main" xmlns="">
+      <p15:notesGuideLst xmlns="" xmlns:p15="http://schemas.microsoft.com/office/powerpoint/2012/main">
         <p15:guide id="1" orient="horz" pos="2964">
           <p15:clr>
             <a:srgbClr val="A4A3A4"/>
@@ -6892,14 +6891,14 @@
       </p:sp>
       <p:sp>
         <p:nvSpPr>
-          <p:cNvPr id="4" name="CuadroTexto 3"/>
+          <p:cNvPr id="5" name="CuadroTexto 4"/>
           <p:cNvSpPr txBox="1"/>
           <p:nvPr/>
         </p:nvSpPr>
         <p:spPr>
           <a:xfrm>
-            <a:off x="539552" y="5589240"/>
-            <a:ext cx="6612470" cy="357790"/>
+            <a:off x="303050" y="5616373"/>
+            <a:ext cx="6933246" cy="620939"/>
           </a:xfrm>
           <a:prstGeom prst="rect">
             <a:avLst/>
@@ -6913,34 +6912,21 @@
           <a:lstStyle/>
           <a:p>
             <a:r>
-              <a:rPr lang="de-DE" dirty="0">
-                <a:solidFill>
-                  <a:srgbClr val="0000FF"/>
-                </a:solidFill>
+              <a:rPr lang="en-US" dirty="0">
+                <a:hlinkClick r:id="rId2"/>
               </a:rPr>
-              <a:t>https://</a:t>
-            </a:r>
-            <a:r>
-              <a:rPr lang="de-DE" dirty="0" err="1">
-                <a:solidFill>
-                  <a:srgbClr val="0000FF"/>
-                </a:solidFill>
+              <a:t>https://github.com/AFNetworking/AFNetworking/releases/tag/</a:t>
+            </a:r>
+            <a:r>
+              <a:rPr lang="en-US" dirty="0" smtClean="0">
+                <a:hlinkClick r:id="rId2"/>
               </a:rPr>
-              <a:t>www.raywenderlich.com</a:t>
-            </a:r>
-            <a:r>
-              <a:rPr lang="de-DE" dirty="0">
-                <a:solidFill>
-                  <a:srgbClr val="0000FF"/>
-                </a:solidFill>
-              </a:rPr>
-              <a:t>/59255/afnetworking-2-0-tutorial</a:t>
-            </a:r>
-            <a:endParaRPr lang="es-ES" dirty="0">
-              <a:solidFill>
-                <a:srgbClr val="0000FF"/>
-              </a:solidFill>
-            </a:endParaRPr>
+              <a:t>2.5.4</a:t>
+            </a:r>
+            <a:endParaRPr lang="es-ES" dirty="0" smtClean="0"/>
+          </a:p>
+          <a:p>
+            <a:endParaRPr lang="en-US" dirty="0" smtClean="0"/>
           </a:p>
         </p:txBody>
       </p:sp>
@@ -6948,141 +6934,6 @@
     <p:extLst>
       <p:ext uri="{BB962C8B-B14F-4D97-AF65-F5344CB8AC3E}">
         <p14:creationId xmlns:p14="http://schemas.microsoft.com/office/powerpoint/2010/main" val="1216359280"/>
-      </p:ext>
-    </p:extLst>
-  </p:cSld>
-  <p:clrMapOvr>
-    <a:masterClrMapping/>
-  </p:clrMapOvr>
-  <p:transition xmlns:p14="http://schemas.microsoft.com/office/powerpoint/2010/main"/>
-</p:sld>
-</file>
-
-<file path=ppt/slides/slide23.xml><?xml version="1.0" encoding="utf-8"?>
-<p:sld xmlns:a="http://schemas.openxmlformats.org/drawingml/2006/main" xmlns:r="http://schemas.openxmlformats.org/officeDocument/2006/relationships" xmlns:p="http://schemas.openxmlformats.org/presentationml/2006/main">
-  <p:cSld>
-    <p:spTree>
-      <p:nvGrpSpPr>
-        <p:cNvPr id="1" name=""/>
-        <p:cNvGrpSpPr/>
-        <p:nvPr/>
-      </p:nvGrpSpPr>
-      <p:grpSpPr>
-        <a:xfrm>
-          <a:off x="0" y="0"/>
-          <a:ext cx="0" cy="0"/>
-          <a:chOff x="0" y="0"/>
-          <a:chExt cx="0" cy="0"/>
-        </a:xfrm>
-      </p:grpSpPr>
-      <p:sp>
-        <p:nvSpPr>
-          <p:cNvPr id="2" name="Título 1"/>
-          <p:cNvSpPr>
-            <a:spLocks noGrp="1"/>
-          </p:cNvSpPr>
-          <p:nvPr>
-            <p:ph type="title"/>
-          </p:nvPr>
-        </p:nvSpPr>
-        <p:spPr>
-          <a:xfrm>
-            <a:off x="251521" y="476672"/>
-            <a:ext cx="8352928" cy="648072"/>
-          </a:xfrm>
-        </p:spPr>
-        <p:txBody>
-          <a:bodyPr/>
-          <a:lstStyle/>
-          <a:p>
-            <a:r>
-              <a:rPr lang="es-ES" dirty="0"/>
-              <a:t>Controladores de alertas (</a:t>
-            </a:r>
-            <a:r>
-              <a:rPr lang="es-ES" dirty="0" err="1"/>
-              <a:t>UIAlertController</a:t>
-            </a:r>
-            <a:r>
-              <a:rPr lang="es-ES" dirty="0" smtClean="0"/>
-              <a:t>)</a:t>
-            </a:r>
-            <a:endParaRPr lang="es-ES" dirty="0"/>
-          </a:p>
-        </p:txBody>
-      </p:sp>
-      <p:sp>
-        <p:nvSpPr>
-          <p:cNvPr id="6" name="CuadroTexto 5"/>
-          <p:cNvSpPr txBox="1"/>
-          <p:nvPr/>
-        </p:nvSpPr>
-        <p:spPr>
-          <a:xfrm>
-            <a:off x="179512" y="1412776"/>
-            <a:ext cx="8784976" cy="884088"/>
-          </a:xfrm>
-          <a:prstGeom prst="rect">
-            <a:avLst/>
-          </a:prstGeom>
-          <a:noFill/>
-        </p:spPr>
-        <p:txBody>
-          <a:bodyPr wrap="square" rtlCol="0">
-            <a:spAutoFit/>
-          </a:bodyPr>
-          <a:lstStyle/>
-          <a:p>
-            <a:pPr algn="just"/>
-            <a:r>
-              <a:rPr lang="es-ES" dirty="0" smtClean="0"/>
-              <a:t>La clase </a:t>
-            </a:r>
-            <a:r>
-              <a:rPr lang="es-ES" dirty="0" err="1" smtClean="0"/>
-              <a:t>UIAlertController</a:t>
-            </a:r>
-            <a:r>
-              <a:rPr lang="es-ES" dirty="0" smtClean="0"/>
-              <a:t> es la responsable de mostrar ventanas modales para enviar mensajes o buscar una interacción con el usuario en cuanto si acepta o no informaciones.</a:t>
-            </a:r>
-          </a:p>
-        </p:txBody>
-      </p:sp>
-      <p:pic>
-        <p:nvPicPr>
-          <p:cNvPr id="3" name="Imagen 2" descr="Screen Shot 2016-05-14 at 12.06.20 AM.png"/>
-          <p:cNvPicPr>
-            <a:picLocks noChangeAspect="1"/>
-          </p:cNvPicPr>
-          <p:nvPr/>
-        </p:nvPicPr>
-        <p:blipFill>
-          <a:blip r:embed="rId2">
-            <a:extLst>
-              <a:ext uri="{28A0092B-C50C-407E-A947-70E740481C1C}">
-                <a14:useLocalDpi xmlns:a14="http://schemas.microsoft.com/office/drawing/2010/main" val="0"/>
-              </a:ext>
-            </a:extLst>
-          </a:blip>
-          <a:stretch>
-            <a:fillRect/>
-          </a:stretch>
-        </p:blipFill>
-        <p:spPr>
-          <a:xfrm>
-            <a:off x="323528" y="2564904"/>
-            <a:ext cx="8496671" cy="2602689"/>
-          </a:xfrm>
-          <a:prstGeom prst="rect">
-            <a:avLst/>
-          </a:prstGeom>
-        </p:spPr>
-      </p:pic>
-    </p:spTree>
-    <p:extLst>
-      <p:ext uri="{BB962C8B-B14F-4D97-AF65-F5344CB8AC3E}">
-        <p14:creationId xmlns:p14="http://schemas.microsoft.com/office/powerpoint/2010/main" val="3608667568"/>
       </p:ext>
     </p:extLst>
   </p:cSld>
@@ -7197,11 +7048,7 @@
             </a:pPr>
             <a:r>
               <a:rPr lang="es-ES" sz="1600" dirty="0" smtClean="0"/>
-              <a:t>Protocolos y </a:t>
-            </a:r>
-            <a:r>
-              <a:rPr lang="es-ES" sz="1600" dirty="0" smtClean="0"/>
-              <a:t>delegados</a:t>
+              <a:t>Protocolos y delegados</a:t>
             </a:r>
           </a:p>
           <a:p>
@@ -7213,7 +7060,6 @@
               <a:rPr lang="es-ES" sz="1600" dirty="0" smtClean="0"/>
               <a:t>Selectores</a:t>
             </a:r>
-            <a:endParaRPr lang="es-ES" sz="1600" dirty="0" smtClean="0"/>
           </a:p>
           <a:p>
             <a:pPr marL="514350" indent="-514350">
@@ -7222,11 +7068,7 @@
             </a:pPr>
             <a:r>
               <a:rPr lang="es-ES" sz="1600" dirty="0" smtClean="0"/>
-              <a:t>Rotación </a:t>
-            </a:r>
-            <a:r>
-              <a:rPr lang="es-ES" sz="1600" dirty="0" smtClean="0"/>
-              <a:t>de pantalla</a:t>
+              <a:t>Rotación de pantalla</a:t>
             </a:r>
           </a:p>
           <a:p>
@@ -7292,7 +7134,6 @@
               <a:rPr lang="es-ES" sz="1600" dirty="0" smtClean="0"/>
               <a:t>Ejercicio</a:t>
             </a:r>
-            <a:endParaRPr lang="es-ES" sz="1600" dirty="0" smtClean="0"/>
           </a:p>
           <a:p>
             <a:pPr marL="514350" indent="-514350">
@@ -7313,7 +7154,6 @@
               <a:rPr lang="es-ES" sz="1600" dirty="0" smtClean="0"/>
               <a:t>Cámara</a:t>
             </a:r>
-            <a:endParaRPr lang="es-ES" sz="1600" dirty="0" smtClean="0"/>
           </a:p>
           <a:p>
             <a:pPr marL="514350" indent="-514350">
@@ -7322,11 +7162,7 @@
             </a:pPr>
             <a:r>
               <a:rPr lang="es-ES" sz="1600" dirty="0" smtClean="0"/>
-              <a:t>Audio y </a:t>
-            </a:r>
-            <a:r>
-              <a:rPr lang="es-ES" sz="1600" dirty="0" smtClean="0"/>
-              <a:t>video</a:t>
+              <a:t>Audio y video</a:t>
             </a:r>
           </a:p>
           <a:p>
@@ -7353,7 +7189,6 @@
               <a:rPr lang="es-ES" sz="1600" dirty="0" smtClean="0"/>
               <a:t>Ejercicio</a:t>
             </a:r>
-            <a:endParaRPr lang="es-ES" sz="1600" dirty="0" smtClean="0"/>
           </a:p>
           <a:p>
             <a:pPr marL="514350" indent="-514350">

</xml_diff>